<commit_message>
Issue #13 content for review
</commit_message>
<xml_diff>
--- a/_images/source_diagrams.pptx
+++ b/_images/source_diagrams.pptx
@@ -5,10 +5,10 @@
     <p:sldMasterId id="2147483661" r:id="rId1"/>
   </p:sldMasterIdLst>
   <p:notesMasterIdLst>
-    <p:notesMasterId r:id="rId8"/>
+    <p:notesMasterId r:id="rId9"/>
   </p:notesMasterIdLst>
   <p:handoutMasterIdLst>
-    <p:handoutMasterId r:id="rId9"/>
+    <p:handoutMasterId r:id="rId10"/>
   </p:handoutMasterIdLst>
   <p:sldIdLst>
     <p:sldId id="1506" r:id="rId2"/>
@@ -17,6 +17,7 @@
     <p:sldId id="1507" r:id="rId5"/>
     <p:sldId id="1511" r:id="rId6"/>
     <p:sldId id="1536" r:id="rId7"/>
+    <p:sldId id="1538" r:id="rId8"/>
   </p:sldIdLst>
   <p:sldSz cx="9144000" cy="5715000" type="screen16x10"/>
   <p:notesSz cx="6858000" cy="9144000"/>
@@ -238,7 +239,7 @@
             <a:fld id="{18967AA6-1341-3C45-8D06-A65AADBACDEC}" type="datetimeFigureOut">
               <a:rPr lang="en-US" smtClean="0"/>
               <a:pPr/>
-              <a:t>9/21/20</a:t>
+              <a:t>10/22/20</a:t>
             </a:fld>
             <a:endParaRPr lang="en-US"/>
           </a:p>
@@ -406,7 +407,7 @@
             <a:fld id="{F7ABB16E-D75F-D447-8E41-C97CF1271134}" type="datetimeFigureOut">
               <a:rPr lang="en-US" smtClean="0"/>
               <a:pPr/>
-              <a:t>9/21/20</a:t>
+              <a:t>10/22/20</a:t>
             </a:fld>
             <a:endParaRPr lang="en-US"/>
           </a:p>
@@ -869,7 +870,7 @@
           <a:p>
             <a:fld id="{7005A5B1-6552-B641-B2F3-DEF9D35BC49E}" type="datetime1">
               <a:rPr lang="en-US" smtClean="0"/>
-              <a:t>9/21/20</a:t>
+              <a:t>10/22/20</a:t>
             </a:fld>
             <a:endParaRPr lang="en-US" dirty="0"/>
           </a:p>
@@ -1066,7 +1067,7 @@
           <a:p>
             <a:fld id="{BCAA18F3-05A7-7547-96CF-A7D760AB21E5}" type="datetime1">
               <a:rPr lang="en-US" smtClean="0"/>
-              <a:t>9/21/20</a:t>
+              <a:t>10/22/20</a:t>
             </a:fld>
             <a:endParaRPr lang="en-US" dirty="0"/>
           </a:p>
@@ -1273,7 +1274,7 @@
           <a:p>
             <a:fld id="{F1C9E796-8630-B44E-B303-3B928CBF3E8B}" type="datetime1">
               <a:rPr lang="en-US" smtClean="0"/>
-              <a:t>9/21/20</a:t>
+              <a:t>10/22/20</a:t>
             </a:fld>
             <a:endParaRPr lang="en-US" dirty="0"/>
           </a:p>
@@ -1471,7 +1472,7 @@
           <a:p>
             <a:fld id="{2C73A9E8-89C9-234D-B044-A977C3E8A01F}" type="datetime1">
               <a:rPr lang="en-US" smtClean="0"/>
-              <a:t>9/21/20</a:t>
+              <a:t>10/22/20</a:t>
             </a:fld>
             <a:endParaRPr lang="en-US" dirty="0"/>
           </a:p>
@@ -1745,7 +1746,7 @@
           <a:p>
             <a:fld id="{9ADAB988-7D1D-5E46-B930-B927B63F5DB0}" type="datetime1">
               <a:rPr lang="en-US" smtClean="0"/>
-              <a:t>9/21/20</a:t>
+              <a:t>10/22/20</a:t>
             </a:fld>
             <a:endParaRPr lang="en-US" dirty="0"/>
           </a:p>
@@ -2059,7 +2060,7 @@
           <a:p>
             <a:fld id="{E85FE5E3-C810-954C-A404-7E0B848F2366}" type="datetime1">
               <a:rPr lang="en-US" smtClean="0"/>
-              <a:t>9/21/20</a:t>
+              <a:t>10/22/20</a:t>
             </a:fld>
             <a:endParaRPr lang="en-US" dirty="0"/>
           </a:p>
@@ -2512,7 +2513,7 @@
           <a:p>
             <a:fld id="{2DB37D1F-5141-914D-9168-7BACC3016431}" type="datetime1">
               <a:rPr lang="en-US" smtClean="0"/>
-              <a:t>9/21/20</a:t>
+              <a:t>10/22/20</a:t>
             </a:fld>
             <a:endParaRPr lang="en-US" dirty="0"/>
           </a:p>
@@ -2658,7 +2659,7 @@
           <a:p>
             <a:fld id="{5C2341AA-E87D-664A-9CB9-CFE5C02D4760}" type="datetime1">
               <a:rPr lang="en-US" smtClean="0"/>
-              <a:t>9/21/20</a:t>
+              <a:t>10/22/20</a:t>
             </a:fld>
             <a:endParaRPr lang="en-US" dirty="0"/>
           </a:p>
@@ -2782,7 +2783,7 @@
           <a:p>
             <a:fld id="{81AD9DAC-D136-AC46-9E23-4E0C18CA7330}" type="datetime1">
               <a:rPr lang="en-US" smtClean="0"/>
-              <a:t>9/21/20</a:t>
+              <a:t>10/22/20</a:t>
             </a:fld>
             <a:endParaRPr lang="en-US" dirty="0"/>
           </a:p>
@@ -3086,7 +3087,7 @@
           <a:p>
             <a:fld id="{3AC61887-0F80-964F-B223-6B0320C6B323}" type="datetime1">
               <a:rPr lang="en-US" smtClean="0"/>
-              <a:t>9/21/20</a:t>
+              <a:t>10/22/20</a:t>
             </a:fld>
             <a:endParaRPr lang="en-US" dirty="0"/>
           </a:p>
@@ -3370,7 +3371,7 @@
           <a:p>
             <a:fld id="{50910A3E-93F4-3944-92C0-FFED5DA85674}" type="datetime1">
               <a:rPr lang="en-US" smtClean="0"/>
-              <a:t>9/21/20</a:t>
+              <a:t>10/22/20</a:t>
             </a:fld>
             <a:endParaRPr lang="en-US" dirty="0"/>
           </a:p>
@@ -4889,7 +4890,7 @@
             <a:pPr algn="ctr"/>
             <a:r>
               <a:rPr lang="en-US" sz="1400" dirty="0"/>
-              <a:t>Implementation Plan</a:t>
+              <a:t>Guides</a:t>
             </a:r>
           </a:p>
         </p:txBody>
@@ -8692,6 +8693,36 @@
     <p:extLst>
       <p:ext uri="{BB962C8B-B14F-4D97-AF65-F5344CB8AC3E}">
         <p14:creationId xmlns:p14="http://schemas.microsoft.com/office/powerpoint/2010/main" val="666247284"/>
+      </p:ext>
+    </p:extLst>
+  </p:cSld>
+  <p:clrMapOvr>
+    <a:masterClrMapping/>
+  </p:clrMapOvr>
+</p:sld>
+</file>
+
+<file path=ppt/slides/slide7.xml><?xml version="1.0" encoding="utf-8"?>
+<p:sld xmlns:a="http://schemas.openxmlformats.org/drawingml/2006/main" xmlns:r="http://schemas.openxmlformats.org/officeDocument/2006/relationships" xmlns:p="http://schemas.openxmlformats.org/presentationml/2006/main">
+  <p:cSld>
+    <p:spTree>
+      <p:nvGrpSpPr>
+        <p:cNvPr id="1" name=""/>
+        <p:cNvGrpSpPr/>
+        <p:nvPr/>
+      </p:nvGrpSpPr>
+      <p:grpSpPr>
+        <a:xfrm>
+          <a:off x="0" y="0"/>
+          <a:ext cx="0" cy="0"/>
+          <a:chOff x="0" y="0"/>
+          <a:chExt cx="0" cy="0"/>
+        </a:xfrm>
+      </p:grpSpPr>
+    </p:spTree>
+    <p:extLst>
+      <p:ext uri="{BB962C8B-B14F-4D97-AF65-F5344CB8AC3E}">
+        <p14:creationId xmlns:p14="http://schemas.microsoft.com/office/powerpoint/2010/main" val="709660503"/>
       </p:ext>
     </p:extLst>
   </p:cSld>

</xml_diff>